<commit_message>
feat(api-gateway): Use Application Insights for all APIs in API Gateway (#135)
</commit_message>
<xml_diff>
--- a/media/schematics.pptx
+++ b/media/schematics.pptx
@@ -261,7 +261,7 @@
           <a:p>
             <a:fld id="{A62A30C6-6AF3-45D1-A8D8-DAF1BA1270B5}" type="datetimeFigureOut">
               <a:rPr lang="en-BE" smtClean="0"/>
-              <a:t>27/09/2022</a:t>
+              <a:t>29/09/2022</a:t>
             </a:fld>
             <a:endParaRPr lang="en-BE"/>
           </a:p>
@@ -461,7 +461,7 @@
           <a:p>
             <a:fld id="{A62A30C6-6AF3-45D1-A8D8-DAF1BA1270B5}" type="datetimeFigureOut">
               <a:rPr lang="en-BE" smtClean="0"/>
-              <a:t>27/09/2022</a:t>
+              <a:t>29/09/2022</a:t>
             </a:fld>
             <a:endParaRPr lang="en-BE"/>
           </a:p>
@@ -671,7 +671,7 @@
           <a:p>
             <a:fld id="{A62A30C6-6AF3-45D1-A8D8-DAF1BA1270B5}" type="datetimeFigureOut">
               <a:rPr lang="en-BE" smtClean="0"/>
-              <a:t>27/09/2022</a:t>
+              <a:t>29/09/2022</a:t>
             </a:fld>
             <a:endParaRPr lang="en-BE"/>
           </a:p>
@@ -871,7 +871,7 @@
           <a:p>
             <a:fld id="{A62A30C6-6AF3-45D1-A8D8-DAF1BA1270B5}" type="datetimeFigureOut">
               <a:rPr lang="en-BE" smtClean="0"/>
-              <a:t>27/09/2022</a:t>
+              <a:t>29/09/2022</a:t>
             </a:fld>
             <a:endParaRPr lang="en-BE"/>
           </a:p>
@@ -1147,7 +1147,7 @@
           <a:p>
             <a:fld id="{A62A30C6-6AF3-45D1-A8D8-DAF1BA1270B5}" type="datetimeFigureOut">
               <a:rPr lang="en-BE" smtClean="0"/>
-              <a:t>27/09/2022</a:t>
+              <a:t>29/09/2022</a:t>
             </a:fld>
             <a:endParaRPr lang="en-BE"/>
           </a:p>
@@ -1415,7 +1415,7 @@
           <a:p>
             <a:fld id="{A62A30C6-6AF3-45D1-A8D8-DAF1BA1270B5}" type="datetimeFigureOut">
               <a:rPr lang="en-BE" smtClean="0"/>
-              <a:t>27/09/2022</a:t>
+              <a:t>29/09/2022</a:t>
             </a:fld>
             <a:endParaRPr lang="en-BE"/>
           </a:p>
@@ -1830,7 +1830,7 @@
           <a:p>
             <a:fld id="{A62A30C6-6AF3-45D1-A8D8-DAF1BA1270B5}" type="datetimeFigureOut">
               <a:rPr lang="en-BE" smtClean="0"/>
-              <a:t>27/09/2022</a:t>
+              <a:t>29/09/2022</a:t>
             </a:fld>
             <a:endParaRPr lang="en-BE"/>
           </a:p>
@@ -1972,7 +1972,7 @@
           <a:p>
             <a:fld id="{A62A30C6-6AF3-45D1-A8D8-DAF1BA1270B5}" type="datetimeFigureOut">
               <a:rPr lang="en-BE" smtClean="0"/>
-              <a:t>27/09/2022</a:t>
+              <a:t>29/09/2022</a:t>
             </a:fld>
             <a:endParaRPr lang="en-BE"/>
           </a:p>
@@ -2085,7 +2085,7 @@
           <a:p>
             <a:fld id="{A62A30C6-6AF3-45D1-A8D8-DAF1BA1270B5}" type="datetimeFigureOut">
               <a:rPr lang="en-BE" smtClean="0"/>
-              <a:t>27/09/2022</a:t>
+              <a:t>29/09/2022</a:t>
             </a:fld>
             <a:endParaRPr lang="en-BE"/>
           </a:p>
@@ -2398,7 +2398,7 @@
           <a:p>
             <a:fld id="{A62A30C6-6AF3-45D1-A8D8-DAF1BA1270B5}" type="datetimeFigureOut">
               <a:rPr lang="en-BE" smtClean="0"/>
-              <a:t>27/09/2022</a:t>
+              <a:t>29/09/2022</a:t>
             </a:fld>
             <a:endParaRPr lang="en-BE"/>
           </a:p>
@@ -2687,7 +2687,7 @@
           <a:p>
             <a:fld id="{A62A30C6-6AF3-45D1-A8D8-DAF1BA1270B5}" type="datetimeFigureOut">
               <a:rPr lang="en-BE" smtClean="0"/>
-              <a:t>27/09/2022</a:t>
+              <a:t>29/09/2022</a:t>
             </a:fld>
             <a:endParaRPr lang="en-BE"/>
           </a:p>
@@ -2930,7 +2930,7 @@
           <a:p>
             <a:fld id="{A62A30C6-6AF3-45D1-A8D8-DAF1BA1270B5}" type="datetimeFigureOut">
               <a:rPr lang="en-BE" smtClean="0"/>
-              <a:t>27/09/2022</a:t>
+              <a:t>29/09/2022</a:t>
             </a:fld>
             <a:endParaRPr lang="en-BE"/>
           </a:p>
@@ -4242,6 +4242,7 @@
             <a:solidFill>
               <a:schemeClr val="tx1"/>
             </a:solidFill>
+            <a:prstDash val="lgDash"/>
             <a:tailEnd type="triangle"/>
           </a:ln>
         </p:spPr>
@@ -4290,6 +4291,7 @@
             <a:solidFill>
               <a:schemeClr val="tx1"/>
             </a:solidFill>
+            <a:prstDash val="lgDash"/>
             <a:tailEnd type="triangle"/>
           </a:ln>
         </p:spPr>
@@ -4338,6 +4340,7 @@
             <a:solidFill>
               <a:schemeClr val="tx1"/>
             </a:solidFill>
+            <a:prstDash val="lgDash"/>
             <a:tailEnd type="triangle"/>
           </a:ln>
         </p:spPr>
@@ -4666,6 +4669,204 @@
           </a:p>
         </p:txBody>
       </p:sp>
+      <p:grpSp>
+        <p:nvGrpSpPr>
+          <p:cNvPr id="8" name="Group 7">
+            <a:extLst>
+              <a:ext uri="{FF2B5EF4-FFF2-40B4-BE49-F238E27FC236}">
+                <a16:creationId xmlns:a16="http://schemas.microsoft.com/office/drawing/2014/main" id="{827889D4-3B4E-6CD2-C995-45453CE8E41B}"/>
+              </a:ext>
+            </a:extLst>
+          </p:cNvPr>
+          <p:cNvGrpSpPr/>
+          <p:nvPr/>
+        </p:nvGrpSpPr>
+        <p:grpSpPr>
+          <a:xfrm>
+            <a:off x="2065884" y="5180443"/>
+            <a:ext cx="2486025" cy="1315431"/>
+            <a:chOff x="1189253" y="5072155"/>
+            <a:chExt cx="2486025" cy="1315431"/>
+          </a:xfrm>
+        </p:grpSpPr>
+        <p:pic>
+          <p:nvPicPr>
+            <p:cNvPr id="4" name="Graphic 3">
+              <a:extLst>
+                <a:ext uri="{FF2B5EF4-FFF2-40B4-BE49-F238E27FC236}">
+                  <a16:creationId xmlns:a16="http://schemas.microsoft.com/office/drawing/2014/main" id="{4C1362C4-9DD5-9228-89E4-A9EF37024EB5}"/>
+                </a:ext>
+              </a:extLst>
+            </p:cNvPr>
+            <p:cNvPicPr>
+              <a:picLocks noChangeAspect="1"/>
+            </p:cNvPicPr>
+            <p:nvPr/>
+          </p:nvPicPr>
+          <p:blipFill>
+            <a:blip r:embed="rId12">
+              <a:extLst>
+                <a:ext uri="{28A0092B-C50C-407E-A947-70E740481C1C}">
+                  <a14:useLocalDpi xmlns:a14="http://schemas.microsoft.com/office/drawing/2010/main" val="0"/>
+                </a:ext>
+                <a:ext uri="{96DAC541-7B7A-43D3-8B79-37D633B846F1}">
+                  <asvg:svgBlip xmlns:asvg="http://schemas.microsoft.com/office/drawing/2016/SVG/main" r:embed="rId13"/>
+                </a:ext>
+              </a:extLst>
+            </a:blip>
+            <a:stretch>
+              <a:fillRect/>
+            </a:stretch>
+          </p:blipFill>
+          <p:spPr>
+            <a:xfrm>
+              <a:off x="2066865" y="5072155"/>
+              <a:ext cx="730800" cy="730800"/>
+            </a:xfrm>
+            <a:prstGeom prst="rect">
+              <a:avLst/>
+            </a:prstGeom>
+          </p:spPr>
+        </p:pic>
+        <p:sp>
+          <p:nvSpPr>
+            <p:cNvPr id="6" name="TextBox 5">
+              <a:extLst>
+                <a:ext uri="{FF2B5EF4-FFF2-40B4-BE49-F238E27FC236}">
+                  <a16:creationId xmlns:a16="http://schemas.microsoft.com/office/drawing/2014/main" id="{74AB5527-A605-AACE-EE27-5227D1BBE7B1}"/>
+                </a:ext>
+              </a:extLst>
+            </p:cNvPr>
+            <p:cNvSpPr txBox="1"/>
+            <p:nvPr/>
+          </p:nvSpPr>
+          <p:spPr>
+            <a:xfrm>
+              <a:off x="1189253" y="5864366"/>
+              <a:ext cx="2486025" cy="523220"/>
+            </a:xfrm>
+            <a:prstGeom prst="rect">
+              <a:avLst/>
+            </a:prstGeom>
+            <a:noFill/>
+          </p:spPr>
+          <p:txBody>
+            <a:bodyPr wrap="square">
+              <a:spAutoFit/>
+            </a:bodyPr>
+            <a:lstStyle/>
+            <a:p>
+              <a:pPr algn="ctr"/>
+              <a:r>
+                <a:rPr lang="en-US" sz="1400" b="0" i="0" u="none" strike="noStrike" baseline="0" dirty="0">
+                  <a:solidFill>
+                    <a:srgbClr val="000000"/>
+                  </a:solidFill>
+                  <a:latin typeface="Calibri" panose="020F0502020204030204" pitchFamily="34" charset="0"/>
+                </a:rPr>
+                <a:t>Logs, Dependency Tracking &amp; Application Landscape</a:t>
+              </a:r>
+              <a:endParaRPr lang="en-BE" sz="1400" dirty="0"/>
+            </a:p>
+          </p:txBody>
+        </p:sp>
+      </p:grpSp>
+      <p:cxnSp>
+        <p:nvCxnSpPr>
+          <p:cNvPr id="10" name="Straight Arrow Connector 34">
+            <a:extLst>
+              <a:ext uri="{FF2B5EF4-FFF2-40B4-BE49-F238E27FC236}">
+                <a16:creationId xmlns:a16="http://schemas.microsoft.com/office/drawing/2014/main" id="{2D85248B-F5EE-E7B2-1B36-6F57EAEF1C4A}"/>
+              </a:ext>
+            </a:extLst>
+          </p:cNvPr>
+          <p:cNvCxnSpPr>
+            <a:cxnSpLocks/>
+            <a:stCxn id="9" idx="1"/>
+            <a:endCxn id="4" idx="3"/>
+          </p:cNvCxnSpPr>
+          <p:nvPr/>
+        </p:nvCxnSpPr>
+        <p:spPr>
+          <a:xfrm rot="10800000">
+            <a:off x="3674297" y="5545844"/>
+            <a:ext cx="1755587" cy="2483"/>
+          </a:xfrm>
+          <a:prstGeom prst="bentConnector3">
+            <a:avLst>
+              <a:gd name="adj1" fmla="val 50000"/>
+            </a:avLst>
+          </a:prstGeom>
+          <a:ln>
+            <a:solidFill>
+              <a:schemeClr val="tx1"/>
+            </a:solidFill>
+            <a:prstDash val="lgDash"/>
+            <a:tailEnd type="triangle"/>
+          </a:ln>
+        </p:spPr>
+        <p:style>
+          <a:lnRef idx="1">
+            <a:schemeClr val="accent1"/>
+          </a:lnRef>
+          <a:fillRef idx="0">
+            <a:schemeClr val="accent1"/>
+          </a:fillRef>
+          <a:effectRef idx="0">
+            <a:schemeClr val="accent1"/>
+          </a:effectRef>
+          <a:fontRef idx="minor">
+            <a:schemeClr val="tx1"/>
+          </a:fontRef>
+        </p:style>
+      </p:cxnSp>
+      <p:cxnSp>
+        <p:nvCxnSpPr>
+          <p:cNvPr id="21" name="Straight Arrow Connector 34">
+            <a:extLst>
+              <a:ext uri="{FF2B5EF4-FFF2-40B4-BE49-F238E27FC236}">
+                <a16:creationId xmlns:a16="http://schemas.microsoft.com/office/drawing/2014/main" id="{EB569974-856A-C58E-E2BD-A81132EC0979}"/>
+              </a:ext>
+            </a:extLst>
+          </p:cNvPr>
+          <p:cNvCxnSpPr>
+            <a:cxnSpLocks/>
+            <a:stCxn id="18" idx="1"/>
+            <a:endCxn id="4" idx="0"/>
+          </p:cNvCxnSpPr>
+          <p:nvPr/>
+        </p:nvCxnSpPr>
+        <p:spPr>
+          <a:xfrm rot="10800000" flipV="1">
+            <a:off x="3308896" y="3145981"/>
+            <a:ext cx="471406" cy="2034461"/>
+          </a:xfrm>
+          <a:prstGeom prst="bentConnector2">
+            <a:avLst/>
+          </a:prstGeom>
+          <a:ln>
+            <a:solidFill>
+              <a:schemeClr val="tx1"/>
+            </a:solidFill>
+            <a:prstDash val="lgDash"/>
+            <a:tailEnd type="triangle"/>
+          </a:ln>
+        </p:spPr>
+        <p:style>
+          <a:lnRef idx="1">
+            <a:schemeClr val="accent1"/>
+          </a:lnRef>
+          <a:fillRef idx="0">
+            <a:schemeClr val="accent1"/>
+          </a:fillRef>
+          <a:effectRef idx="0">
+            <a:schemeClr val="accent1"/>
+          </a:effectRef>
+          <a:fontRef idx="minor">
+            <a:schemeClr val="tx1"/>
+          </a:fontRef>
+        </p:style>
+      </p:cxnSp>
     </p:spTree>
     <p:extLst>
       <p:ext uri="{BB962C8B-B14F-4D97-AF65-F5344CB8AC3E}">

</xml_diff>